<commit_message>
Ajout des routes de prédiction et exécution de script
</commit_message>
<xml_diff>
--- a/PPT/MyImmo - Seance 3.pptx
+++ b/PPT/MyImmo - Seance 3.pptx
@@ -212,7 +212,7 @@
           <a:p>
             <a:fld id="{4F820A91-B9A9-471D-A6DB-0A8A3EC793DF}" type="datetimeFigureOut">
               <a:rPr lang="fr-FR" smtClean="0"/>
-              <a:t>04/06/2021</a:t>
+              <a:t>09/06/2021</a:t>
             </a:fld>
             <a:endParaRPr lang="fr-FR"/>
           </a:p>
@@ -377,7 +377,7 @@
           <a:p>
             <a:fld id="{192834E6-394E-4A29-A065-F0BFB7070DD8}" type="datetimeFigureOut">
               <a:rPr lang="fr-FR" smtClean="0"/>
-              <a:t>04/06/2021</a:t>
+              <a:t>09/06/2021</a:t>
             </a:fld>
             <a:endParaRPr lang="fr-FR"/>
           </a:p>
@@ -1240,7 +1240,7 @@
             <a:pPr rtl="0"/>
             <a:fld id="{3FAA793B-D01C-4F5B-B8D8-6B4B22468D24}" type="datetime1">
               <a:rPr lang="fr-FR" smtClean="0"/>
-              <a:t>04/06/2021</a:t>
+              <a:t>09/06/2021</a:t>
             </a:fld>
             <a:endParaRPr lang="fr-FR" dirty="0"/>
           </a:p>
@@ -1440,7 +1440,7 @@
             <a:pPr rtl="0"/>
             <a:fld id="{C14C5BE1-4F4C-471B-964C-C4E6004DEADB}" type="datetime1">
               <a:rPr lang="fr-FR" smtClean="0"/>
-              <a:t>04/06/2021</a:t>
+              <a:t>09/06/2021</a:t>
             </a:fld>
             <a:endParaRPr lang="fr-FR" dirty="0"/>
           </a:p>
@@ -1630,7 +1630,7 @@
             <a:fld id="{FD2174C0-AAFC-40FA-A210-5BC0E70F2E35}" type="datetime1">
               <a:rPr lang="fr-FR" smtClean="0"/>
               <a:pPr/>
-              <a:t>04/06/2021</a:t>
+              <a:t>09/06/2021</a:t>
             </a:fld>
             <a:endParaRPr lang="fr-FR" dirty="0"/>
           </a:p>
@@ -2160,7 +2160,7 @@
             <a:fld id="{1BCE1244-2061-4A1B-BE44-C57F1176482C}" type="datetime1">
               <a:rPr lang="fr-FR" smtClean="0"/>
               <a:pPr/>
-              <a:t>04/06/2021</a:t>
+              <a:t>09/06/2021</a:t>
             </a:fld>
             <a:endParaRPr lang="fr-FR" dirty="0"/>
           </a:p>
@@ -2608,7 +2608,7 @@
             <a:pPr rtl="0"/>
             <a:fld id="{AE177936-4305-420E-ADB5-331C437845B8}" type="datetime1">
               <a:rPr lang="fr-FR" smtClean="0"/>
-              <a:t>04/06/2021</a:t>
+              <a:t>09/06/2021</a:t>
             </a:fld>
             <a:endParaRPr lang="fr-FR" dirty="0"/>
           </a:p>
@@ -2742,7 +2742,7 @@
             <a:pPr rtl="0"/>
             <a:fld id="{E8BBE45D-5312-4E6F-B811-C47C3A30D5AB}" type="datetime1">
               <a:rPr lang="fr-FR" smtClean="0"/>
-              <a:t>04/06/2021</a:t>
+              <a:t>09/06/2021</a:t>
             </a:fld>
             <a:endParaRPr lang="fr-FR" dirty="0"/>
           </a:p>
@@ -2852,7 +2852,7 @@
             <a:pPr rtl="0"/>
             <a:fld id="{C39832E5-C38C-4E13-866E-BFFBFCD4F635}" type="datetime1">
               <a:rPr lang="fr-FR" smtClean="0"/>
-              <a:t>04/06/2021</a:t>
+              <a:t>09/06/2021</a:t>
             </a:fld>
             <a:endParaRPr lang="fr-FR" dirty="0"/>
           </a:p>
@@ -3152,7 +3152,7 @@
             <a:pPr rtl="0"/>
             <a:fld id="{94FE6DAB-83B7-4A08-8CB8-D73B0434511A}" type="datetime1">
               <a:rPr lang="fr-FR" smtClean="0"/>
-              <a:t>04/06/2021</a:t>
+              <a:t>09/06/2021</a:t>
             </a:fld>
             <a:endParaRPr lang="fr-FR" dirty="0"/>
           </a:p>
@@ -3435,7 +3435,7 @@
             <a:fld id="{4437EAC7-A828-4647-8196-D8948109078E}" type="datetime1">
               <a:rPr lang="fr-FR" smtClean="0"/>
               <a:pPr/>
-              <a:t>04/06/2021</a:t>
+              <a:t>09/06/2021</a:t>
             </a:fld>
             <a:endParaRPr lang="fr-FR" dirty="0"/>
           </a:p>
@@ -3730,7 +3730,7 @@
             <a:fld id="{E24C68AF-FB3F-48C7-BE77-CA17C03A5DA9}" type="datetime1">
               <a:rPr lang="fr-FR" smtClean="0"/>
               <a:pPr/>
-              <a:t>04/06/2021</a:t>
+              <a:t>09/06/2021</a:t>
             </a:fld>
             <a:endParaRPr lang="fr-FR" dirty="0"/>
           </a:p>
@@ -4219,7 +4219,7 @@
             <a:pPr algn="ctr" rtl="0"/>
             <a:r>
               <a:rPr lang="fr-FR" dirty="0"/>
-              <a:t>Séance 2</a:t>
+              <a:t>Séance 3</a:t>
             </a:r>
           </a:p>
           <a:p>
@@ -6187,7 +6187,7 @@
             <a:pPr lvl="1"/>
             <a:r>
               <a:rPr lang="fr-FR" dirty="0"/>
-              <a:t>Type de  mutation : « vente » et vente en l’état futur d’achèvement »</a:t>
+              <a:t>Type de  mutation : « vente » et « vente en l’état futur d’achèvement »</a:t>
             </a:r>
           </a:p>
           <a:p>
@@ -6484,7 +6484,7 @@
             </a:r>
             <a:r>
               <a:rPr lang="fr-FR" dirty="0"/>
-              <a:t>::</a:t>
+              <a:t>:</a:t>
             </a:r>
           </a:p>
           <a:p>
@@ -6751,7 +6751,7 @@
         </p:blipFill>
         <p:spPr bwMode="auto">
           <a:xfrm>
-            <a:off x="2259694" y="4057230"/>
+            <a:off x="2628809" y="4274281"/>
             <a:ext cx="1388798" cy="1006375"/>
           </a:xfrm>
           <a:prstGeom prst="rect">
@@ -6798,7 +6798,7 @@
         </p:blipFill>
         <p:spPr bwMode="auto">
           <a:xfrm>
-            <a:off x="4425568" y="1670786"/>
+            <a:off x="5291703" y="1937928"/>
             <a:ext cx="1105735" cy="1149097"/>
           </a:xfrm>
           <a:prstGeom prst="rect">
@@ -6816,53 +6816,6 @@
           </a:extLst>
         </p:spPr>
       </p:pic>
-      <p:pic>
-        <p:nvPicPr>
-          <p:cNvPr id="1048" name="Picture 24" descr="Download How To Use Aws Sagemaker - Amazon Sagemaker Logo - Full Size PNG  Image - PNGkit">
-            <a:extLst>
-              <a:ext uri="{FF2B5EF4-FFF2-40B4-BE49-F238E27FC236}">
-                <a16:creationId xmlns:a16="http://schemas.microsoft.com/office/drawing/2014/main" id="{236C400E-E9AF-48EB-AC6F-90EE5B34D0B2}"/>
-              </a:ext>
-            </a:extLst>
-          </p:cNvPr>
-          <p:cNvPicPr>
-            <a:picLocks noChangeAspect="1" noChangeArrowheads="1"/>
-          </p:cNvPicPr>
-          <p:nvPr/>
-        </p:nvPicPr>
-        <p:blipFill>
-          <a:blip r:embed="rId5">
-            <a:extLst>
-              <a:ext uri="{28A0092B-C50C-407E-A947-70E740481C1C}">
-                <a14:useLocalDpi xmlns:a14="http://schemas.microsoft.com/office/drawing/2010/main" val="0"/>
-              </a:ext>
-            </a:extLst>
-          </a:blip>
-          <a:srcRect/>
-          <a:stretch>
-            <a:fillRect/>
-          </a:stretch>
-        </p:blipFill>
-        <p:spPr bwMode="auto">
-          <a:xfrm>
-            <a:off x="5440016" y="4037922"/>
-            <a:ext cx="3552305" cy="1323511"/>
-          </a:xfrm>
-          <a:prstGeom prst="rect">
-            <a:avLst/>
-          </a:prstGeom>
-          <a:noFill/>
-          <a:extLst>
-            <a:ext uri="{909E8E84-426E-40DD-AFC4-6F175D3DCCD1}">
-              <a14:hiddenFill xmlns:a14="http://schemas.microsoft.com/office/drawing/2010/main">
-                <a:solidFill>
-                  <a:srgbClr val="FFFFFF"/>
-                </a:solidFill>
-              </a14:hiddenFill>
-            </a:ext>
-          </a:extLst>
-        </p:spPr>
-      </p:pic>
       <p:sp>
         <p:nvSpPr>
           <p:cNvPr id="11" name="ZoneTexte 10">
@@ -6913,7 +6866,7 @@
         </p:nvSpPr>
         <p:spPr>
           <a:xfrm>
-            <a:off x="1887915" y="5206328"/>
+            <a:off x="2257030" y="5292598"/>
             <a:ext cx="2132356" cy="646331"/>
           </a:xfrm>
           <a:prstGeom prst="rect">
@@ -6949,7 +6902,7 @@
         </p:nvSpPr>
         <p:spPr>
           <a:xfrm>
-            <a:off x="3912257" y="2844276"/>
+            <a:off x="4782606" y="3125559"/>
             <a:ext cx="2132356" cy="369332"/>
           </a:xfrm>
           <a:prstGeom prst="rect">
@@ -6987,7 +6940,7 @@
         </p:nvCxnSpPr>
         <p:spPr>
           <a:xfrm>
-            <a:off x="2045774" y="3090645"/>
+            <a:off x="1864271" y="3477505"/>
             <a:ext cx="764538" cy="768291"/>
           </a:xfrm>
           <a:prstGeom prst="straightConnector1">
@@ -7027,13 +6980,12 @@
           </p:cNvPr>
           <p:cNvCxnSpPr>
             <a:cxnSpLocks/>
-            <a:endCxn id="13" idx="1"/>
           </p:cNvCxnSpPr>
           <p:nvPr/>
         </p:nvCxnSpPr>
         <p:spPr>
           <a:xfrm flipV="1">
-            <a:off x="3078760" y="3028942"/>
+            <a:off x="3949109" y="3388309"/>
             <a:ext cx="833497" cy="762882"/>
           </a:xfrm>
           <a:prstGeom prst="straightConnector1">
@@ -7078,7 +7030,7 @@
         </p:nvCxnSpPr>
         <p:spPr>
           <a:xfrm>
-            <a:off x="5947794" y="3090645"/>
+            <a:off x="6745593" y="3413165"/>
             <a:ext cx="1125178" cy="845281"/>
           </a:xfrm>
           <a:prstGeom prst="straightConnector1">
@@ -7101,52 +7053,6 @@
           </a:fillRef>
           <a:effectRef idx="2">
             <a:schemeClr val="accent2"/>
-          </a:effectRef>
-          <a:fontRef idx="minor">
-            <a:schemeClr val="tx1"/>
-          </a:fontRef>
-        </p:style>
-      </p:cxnSp>
-      <p:cxnSp>
-        <p:nvCxnSpPr>
-          <p:cNvPr id="34" name="Connecteur droit avec flèche 33">
-            <a:extLst>
-              <a:ext uri="{FF2B5EF4-FFF2-40B4-BE49-F238E27FC236}">
-                <a16:creationId xmlns:a16="http://schemas.microsoft.com/office/drawing/2014/main" id="{0BF2EB6F-BC43-460F-B052-976560832155}"/>
-              </a:ext>
-            </a:extLst>
-          </p:cNvPr>
-          <p:cNvCxnSpPr>
-            <a:cxnSpLocks/>
-          </p:cNvCxnSpPr>
-          <p:nvPr/>
-        </p:nvCxnSpPr>
-        <p:spPr>
-          <a:xfrm flipV="1">
-            <a:off x="7415868" y="3000193"/>
-            <a:ext cx="967998" cy="935733"/>
-          </a:xfrm>
-          <a:prstGeom prst="straightConnector1">
-            <a:avLst/>
-          </a:prstGeom>
-          <a:ln w="38100">
-            <a:solidFill>
-              <a:schemeClr val="tx1"/>
-            </a:solidFill>
-            <a:prstDash val="sysDot"/>
-            <a:headEnd type="triangle"/>
-            <a:tailEnd type="triangle"/>
-          </a:ln>
-        </p:spPr>
-        <p:style>
-          <a:lnRef idx="1">
-            <a:schemeClr val="accent1"/>
-          </a:lnRef>
-          <a:fillRef idx="0">
-            <a:schemeClr val="accent1"/>
-          </a:fillRef>
-          <a:effectRef idx="0">
-            <a:schemeClr val="accent1"/>
           </a:effectRef>
           <a:fontRef idx="minor">
             <a:schemeClr val="tx1"/>
@@ -7168,7 +7074,7 @@
           <p:nvPr/>
         </p:nvPicPr>
         <p:blipFill rotWithShape="1">
-          <a:blip r:embed="rId6" cstate="print">
+          <a:blip r:embed="rId5" cstate="print">
             <a:extLst>
               <a:ext uri="{28A0092B-C50C-407E-A947-70E740481C1C}">
                 <a14:useLocalDpi xmlns:a14="http://schemas.microsoft.com/office/drawing/2010/main" val="0"/>
@@ -7180,7 +7086,7 @@
         </p:blipFill>
         <p:spPr bwMode="auto">
           <a:xfrm>
-            <a:off x="7820378" y="5460401"/>
+            <a:off x="6612364" y="1152558"/>
             <a:ext cx="1588878" cy="743089"/>
           </a:xfrm>
           <a:prstGeom prst="rect">
@@ -7213,7 +7119,7 @@
           <p:nvPr/>
         </p:nvPicPr>
         <p:blipFill>
-          <a:blip r:embed="rId7" cstate="print">
+          <a:blip r:embed="rId6" cstate="print">
             <a:extLst>
               <a:ext uri="{28A0092B-C50C-407E-A947-70E740481C1C}">
                 <a14:useLocalDpi xmlns:a14="http://schemas.microsoft.com/office/drawing/2010/main" val="0"/>
@@ -7227,7 +7133,7 @@
         </p:blipFill>
         <p:spPr bwMode="auto">
           <a:xfrm>
-            <a:off x="5106816" y="5540941"/>
+            <a:off x="4056186" y="1257621"/>
             <a:ext cx="666400" cy="663807"/>
           </a:xfrm>
           <a:prstGeom prst="rect">
@@ -7260,7 +7166,7 @@
           <p:nvPr/>
         </p:nvPicPr>
         <p:blipFill>
-          <a:blip r:embed="rId8">
+          <a:blip r:embed="rId7">
             <a:extLst>
               <a:ext uri="{28A0092B-C50C-407E-A947-70E740481C1C}">
                 <a14:useLocalDpi xmlns:a14="http://schemas.microsoft.com/office/drawing/2010/main" val="0"/>
@@ -7274,7 +7180,7 @@
         </p:blipFill>
         <p:spPr bwMode="auto">
           <a:xfrm>
-            <a:off x="8033780" y="1756749"/>
+            <a:off x="7308182" y="4151191"/>
             <a:ext cx="4224891" cy="1456859"/>
           </a:xfrm>
           <a:prstGeom prst="rect">
@@ -7307,7 +7213,7 @@
           <p:nvPr/>
         </p:nvPicPr>
         <p:blipFill>
-          <a:blip r:embed="rId9" cstate="print">
+          <a:blip r:embed="rId8" cstate="print">
             <a:extLst>
               <a:ext uri="{28A0092B-C50C-407E-A947-70E740481C1C}">
                 <a14:useLocalDpi xmlns:a14="http://schemas.microsoft.com/office/drawing/2010/main" val="0"/>
@@ -7321,7 +7227,7 @@
         </p:blipFill>
         <p:spPr bwMode="auto">
           <a:xfrm>
-            <a:off x="6248946" y="5484692"/>
+            <a:off x="5199516" y="1132497"/>
             <a:ext cx="1290108" cy="694508"/>
           </a:xfrm>
           <a:prstGeom prst="rect">

</xml_diff>